<commit_message>
add better color defaults to the viz part
</commit_message>
<xml_diff>
--- a/slides/ShortCourse_Visualization.pptx
+++ b/slides/ShortCourse_Visualization.pptx
@@ -5,24 +5,23 @@
     <p:sldMasterId id="2147483716" r:id="rId1"/>
   </p:sldMasterIdLst>
   <p:notesMasterIdLst>
-    <p:notesMasterId r:id="rId9"/>
+    <p:notesMasterId r:id="rId8"/>
   </p:notesMasterIdLst>
   <p:handoutMasterIdLst>
-    <p:handoutMasterId r:id="rId10"/>
+    <p:handoutMasterId r:id="rId9"/>
   </p:handoutMasterIdLst>
   <p:sldIdLst>
     <p:sldId id="353" r:id="rId2"/>
-    <p:sldId id="373" r:id="rId3"/>
-    <p:sldId id="378" r:id="rId4"/>
-    <p:sldId id="387" r:id="rId5"/>
-    <p:sldId id="388" r:id="rId6"/>
-    <p:sldId id="390" r:id="rId7"/>
-    <p:sldId id="383" r:id="rId8"/>
+    <p:sldId id="378" r:id="rId3"/>
+    <p:sldId id="387" r:id="rId4"/>
+    <p:sldId id="388" r:id="rId5"/>
+    <p:sldId id="390" r:id="rId6"/>
+    <p:sldId id="383" r:id="rId7"/>
   </p:sldIdLst>
   <p:sldSz cx="12192000" cy="6858000"/>
   <p:notesSz cx="7315200" cy="9601200"/>
   <p:custDataLst>
-    <p:tags r:id="rId11"/>
+    <p:tags r:id="rId10"/>
   </p:custDataLst>
   <p:defaultTextStyle>
     <a:defPPr>
@@ -242,7 +241,7 @@
           <a:p>
             <a:fld id="{42DE4DD6-0497-4073-A07F-BACAF3B5AA44}" type="datetimeFigureOut">
               <a:rPr lang="en-US" smtClean="0"/>
-              <a:t>4/2/22</a:t>
+              <a:t>4/5/22</a:t>
             </a:fld>
             <a:endParaRPr lang="en-US"/>
           </a:p>
@@ -407,7 +406,7 @@
           <a:p>
             <a:fld id="{B1EB5D17-1482-4B71-829E-DEE524F3DC4D}" type="datetimeFigureOut">
               <a:rPr lang="en-US" smtClean="0"/>
-              <a:t>4/2/22</a:t>
+              <a:t>4/5/22</a:t>
             </a:fld>
             <a:endParaRPr lang="en-US"/>
           </a:p>
@@ -842,7 +841,7 @@
     </p:spTree>
     <p:extLst>
       <p:ext uri="{BB962C8B-B14F-4D97-AF65-F5344CB8AC3E}">
-        <p14:creationId xmlns:p14="http://schemas.microsoft.com/office/powerpoint/2010/main" val="56154233"/>
+        <p14:creationId xmlns:p14="http://schemas.microsoft.com/office/powerpoint/2010/main" val="2098614897"/>
       </p:ext>
     </p:extLst>
   </p:cSld>
@@ -931,7 +930,7 @@
     </p:spTree>
     <p:extLst>
       <p:ext uri="{BB962C8B-B14F-4D97-AF65-F5344CB8AC3E}">
-        <p14:creationId xmlns:p14="http://schemas.microsoft.com/office/powerpoint/2010/main" val="2098614897"/>
+        <p14:creationId xmlns:p14="http://schemas.microsoft.com/office/powerpoint/2010/main" val="1532140683"/>
       </p:ext>
     </p:extLst>
   </p:cSld>
@@ -1020,7 +1019,7 @@
     </p:spTree>
     <p:extLst>
       <p:ext uri="{BB962C8B-B14F-4D97-AF65-F5344CB8AC3E}">
-        <p14:creationId xmlns:p14="http://schemas.microsoft.com/office/powerpoint/2010/main" val="1532140683"/>
+        <p14:creationId xmlns:p14="http://schemas.microsoft.com/office/powerpoint/2010/main" val="1749875766"/>
       </p:ext>
     </p:extLst>
   </p:cSld>
@@ -1101,95 +1100,6 @@
             <a:fld id="{45F8B6A7-DB98-47EE-9BB0-6897AB4B330D}" type="slidenum">
               <a:rPr lang="en-US" smtClean="0"/>
               <a:t>5</a:t>
-            </a:fld>
-            <a:endParaRPr lang="en-US"/>
-          </a:p>
-        </p:txBody>
-      </p:sp>
-    </p:spTree>
-    <p:extLst>
-      <p:ext uri="{BB962C8B-B14F-4D97-AF65-F5344CB8AC3E}">
-        <p14:creationId xmlns:p14="http://schemas.microsoft.com/office/powerpoint/2010/main" val="1749875766"/>
-      </p:ext>
-    </p:extLst>
-  </p:cSld>
-  <p:clrMapOvr>
-    <a:masterClrMapping/>
-  </p:clrMapOvr>
-</p:notes>
-</file>
-
-<file path=ppt/notesSlides/notesSlide6.xml><?xml version="1.0" encoding="utf-8"?>
-<p:notes xmlns:a="http://schemas.openxmlformats.org/drawingml/2006/main" xmlns:r="http://schemas.openxmlformats.org/officeDocument/2006/relationships" xmlns:p="http://schemas.openxmlformats.org/presentationml/2006/main">
-  <p:cSld>
-    <p:spTree>
-      <p:nvGrpSpPr>
-        <p:cNvPr id="1" name=""/>
-        <p:cNvGrpSpPr/>
-        <p:nvPr/>
-      </p:nvGrpSpPr>
-      <p:grpSpPr>
-        <a:xfrm>
-          <a:off x="0" y="0"/>
-          <a:ext cx="0" cy="0"/>
-          <a:chOff x="0" y="0"/>
-          <a:chExt cx="0" cy="0"/>
-        </a:xfrm>
-      </p:grpSpPr>
-      <p:sp>
-        <p:nvSpPr>
-          <p:cNvPr id="2" name="Slide Image Placeholder 1"/>
-          <p:cNvSpPr>
-            <a:spLocks noGrp="1" noRot="1" noChangeAspect="1"/>
-          </p:cNvSpPr>
-          <p:nvPr>
-            <p:ph type="sldImg"/>
-          </p:nvPr>
-        </p:nvSpPr>
-        <p:spPr>
-          <a:xfrm>
-            <a:off x="458788" y="719138"/>
-            <a:ext cx="6399212" cy="3600450"/>
-          </a:xfrm>
-        </p:spPr>
-      </p:sp>
-      <p:sp>
-        <p:nvSpPr>
-          <p:cNvPr id="3" name="Notes Placeholder 2"/>
-          <p:cNvSpPr>
-            <a:spLocks noGrp="1"/>
-          </p:cNvSpPr>
-          <p:nvPr>
-            <p:ph type="body" idx="1"/>
-          </p:nvPr>
-        </p:nvSpPr>
-        <p:spPr/>
-        <p:txBody>
-          <a:bodyPr/>
-          <a:lstStyle/>
-          <a:p>
-            <a:endParaRPr lang="en-US" dirty="0"/>
-          </a:p>
-        </p:txBody>
-      </p:sp>
-      <p:sp>
-        <p:nvSpPr>
-          <p:cNvPr id="4" name="Slide Number Placeholder 3"/>
-          <p:cNvSpPr>
-            <a:spLocks noGrp="1"/>
-          </p:cNvSpPr>
-          <p:nvPr>
-            <p:ph type="sldNum" sz="quarter" idx="10"/>
-          </p:nvPr>
-        </p:nvSpPr>
-        <p:spPr/>
-        <p:txBody>
-          <a:bodyPr/>
-          <a:lstStyle/>
-          <a:p>
-            <a:fld id="{45F8B6A7-DB98-47EE-9BB0-6897AB4B330D}" type="slidenum">
-              <a:rPr lang="en-US" smtClean="0"/>
-              <a:t>6</a:t>
             </a:fld>
             <a:endParaRPr lang="en-US"/>
           </a:p>
@@ -3447,145 +3357,6 @@
           <a:p>
             <a:r>
               <a:rPr lang="en-US" dirty="0"/>
-              <a:t>Looking at data is critical</a:t>
-            </a:r>
-          </a:p>
-          <a:p>
-            <a:pPr lvl="1"/>
-            <a:r>
-              <a:rPr lang="en-US" dirty="0"/>
-              <a:t>True for you as an analyst</a:t>
-            </a:r>
-          </a:p>
-          <a:p>
-            <a:pPr lvl="1"/>
-            <a:r>
-              <a:rPr lang="en-US" dirty="0"/>
-              <a:t>True for you as a communicator</a:t>
-            </a:r>
-          </a:p>
-          <a:p>
-            <a:endParaRPr lang="en-US" dirty="0"/>
-          </a:p>
-          <a:p>
-            <a:r>
-              <a:rPr lang="en-US" dirty="0"/>
-              <a:t>You should make dozens of graphics for each dataset</a:t>
-            </a:r>
-          </a:p>
-          <a:p>
-            <a:pPr lvl="1"/>
-            <a:r>
-              <a:rPr lang="en-US" dirty="0"/>
-              <a:t>Most of these are for your eyes only</a:t>
-            </a:r>
-          </a:p>
-          <a:p>
-            <a:pPr lvl="1"/>
-            <a:r>
-              <a:rPr lang="en-US" dirty="0"/>
-              <a:t>A (small) subset are for others</a:t>
-            </a:r>
-          </a:p>
-          <a:p>
-            <a:pPr lvl="1"/>
-            <a:endParaRPr lang="en-US" dirty="0"/>
-          </a:p>
-          <a:p>
-            <a:pPr lvl="1"/>
-            <a:endParaRPr lang="en-US" dirty="0"/>
-          </a:p>
-          <a:p>
-            <a:pPr lvl="1"/>
-            <a:endParaRPr lang="en-US" dirty="0"/>
-          </a:p>
-          <a:p>
-            <a:pPr lvl="1"/>
-            <a:endParaRPr lang="en-US" dirty="0"/>
-          </a:p>
-          <a:p>
-            <a:pPr lvl="1"/>
-            <a:endParaRPr lang="en-US" dirty="0"/>
-          </a:p>
-          <a:p>
-            <a:pPr lvl="1"/>
-            <a:endParaRPr lang="en-US" dirty="0"/>
-          </a:p>
-          <a:p>
-            <a:endParaRPr lang="en-US" dirty="0"/>
-          </a:p>
-        </p:txBody>
-      </p:sp>
-      <p:sp>
-        <p:nvSpPr>
-          <p:cNvPr id="2" name="Title 1"/>
-          <p:cNvSpPr>
-            <a:spLocks noGrp="1"/>
-          </p:cNvSpPr>
-          <p:nvPr>
-            <p:ph type="title"/>
-          </p:nvPr>
-        </p:nvSpPr>
-        <p:spPr/>
-        <p:txBody>
-          <a:bodyPr/>
-          <a:lstStyle/>
-          <a:p>
-            <a:pPr algn="l"/>
-            <a:r>
-              <a:rPr lang="en-US" dirty="0"/>
-              <a:t>A picture is worth 1000 words</a:t>
-            </a:r>
-          </a:p>
-        </p:txBody>
-      </p:sp>
-    </p:spTree>
-    <p:extLst>
-      <p:ext uri="{BB962C8B-B14F-4D97-AF65-F5344CB8AC3E}">
-        <p14:creationId xmlns:p14="http://schemas.microsoft.com/office/powerpoint/2010/main" val="331574714"/>
-      </p:ext>
-    </p:extLst>
-  </p:cSld>
-  <p:clrMapOvr>
-    <a:masterClrMapping/>
-  </p:clrMapOvr>
-</p:sld>
-</file>
-
-<file path=ppt/slides/slide3.xml><?xml version="1.0" encoding="utf-8"?>
-<p:sld xmlns:a="http://schemas.openxmlformats.org/drawingml/2006/main" xmlns:r="http://schemas.openxmlformats.org/officeDocument/2006/relationships" xmlns:p="http://schemas.openxmlformats.org/presentationml/2006/main">
-  <p:cSld>
-    <p:spTree>
-      <p:nvGrpSpPr>
-        <p:cNvPr id="1" name=""/>
-        <p:cNvGrpSpPr/>
-        <p:nvPr/>
-      </p:nvGrpSpPr>
-      <p:grpSpPr>
-        <a:xfrm>
-          <a:off x="0" y="0"/>
-          <a:ext cx="0" cy="0"/>
-          <a:chOff x="0" y="0"/>
-          <a:chExt cx="0" cy="0"/>
-        </a:xfrm>
-      </p:grpSpPr>
-      <p:sp>
-        <p:nvSpPr>
-          <p:cNvPr id="3" name="Content Placeholder 2"/>
-          <p:cNvSpPr>
-            <a:spLocks noGrp="1"/>
-          </p:cNvSpPr>
-          <p:nvPr>
-            <p:ph idx="1"/>
-          </p:nvPr>
-        </p:nvSpPr>
-        <p:spPr/>
-        <p:txBody>
-          <a:bodyPr/>
-          <a:lstStyle/>
-          <a:p>
-            <a:r>
-              <a:rPr lang="en-US" dirty="0"/>
               <a:t>Makes good graphics with relative ease</a:t>
             </a:r>
           </a:p>
@@ -3854,7 +3625,7 @@
 </p:sld>
 </file>
 
-<file path=ppt/slides/slide4.xml><?xml version="1.0" encoding="utf-8"?>
+<file path=ppt/slides/slide3.xml><?xml version="1.0" encoding="utf-8"?>
 <p:sld xmlns:a="http://schemas.openxmlformats.org/drawingml/2006/main" xmlns:r="http://schemas.openxmlformats.org/officeDocument/2006/relationships" xmlns:p="http://schemas.openxmlformats.org/presentationml/2006/main">
   <p:cSld>
     <p:spTree>
@@ -4071,7 +3842,7 @@
 </p:sld>
 </file>
 
-<file path=ppt/slides/slide5.xml><?xml version="1.0" encoding="utf-8"?>
+<file path=ppt/slides/slide4.xml><?xml version="1.0" encoding="utf-8"?>
 <p:sld xmlns:a="http://schemas.openxmlformats.org/drawingml/2006/main" xmlns:r="http://schemas.openxmlformats.org/officeDocument/2006/relationships" xmlns:p="http://schemas.openxmlformats.org/presentationml/2006/main">
   <p:cSld>
     <p:spTree>
@@ -4224,7 +3995,7 @@
 </p:sld>
 </file>
 
-<file path=ppt/slides/slide6.xml><?xml version="1.0" encoding="utf-8"?>
+<file path=ppt/slides/slide5.xml><?xml version="1.0" encoding="utf-8"?>
 <p:sld xmlns:a="http://schemas.openxmlformats.org/drawingml/2006/main" xmlns:r="http://schemas.openxmlformats.org/officeDocument/2006/relationships" xmlns:p="http://schemas.openxmlformats.org/presentationml/2006/main">
   <p:cSld>
     <p:spTree>
@@ -4393,7 +4164,7 @@
 </p:sld>
 </file>
 
-<file path=ppt/slides/slide7.xml><?xml version="1.0" encoding="utf-8"?>
+<file path=ppt/slides/slide6.xml><?xml version="1.0" encoding="utf-8"?>
 <p:sld xmlns:a="http://schemas.openxmlformats.org/drawingml/2006/main" xmlns:r="http://schemas.openxmlformats.org/officeDocument/2006/relationships" xmlns:p="http://schemas.openxmlformats.org/presentationml/2006/main">
   <p:cSld>
     <p:spTree>

</xml_diff>